<commit_message>
update de powerpoint e refatoracao de arquivo bloco de notas
</commit_message>
<xml_diff>
--- a/assets/documentacao_abnt/PowerPoint Projeto Final SENAI.pptx
+++ b/assets/documentacao_abnt/PowerPoint Projeto Final SENAI.pptx
@@ -316,7 +316,7 @@
           <a:p>
             <a:fld id="{954BD786-5AF5-49DC-9045-FA446815DB20}" type="datetimeFigureOut">
               <a:rPr lang="pt-BR" smtClean="0"/>
-              <a:t>22/11/2022</a:t>
+              <a:t>09/12/2022</a:t>
             </a:fld>
             <a:endParaRPr lang="pt-BR"/>
           </a:p>
@@ -484,7 +484,7 @@
           <a:p>
             <a:fld id="{954BD786-5AF5-49DC-9045-FA446815DB20}" type="datetimeFigureOut">
               <a:rPr lang="pt-BR" smtClean="0"/>
-              <a:t>22/11/2022</a:t>
+              <a:t>09/12/2022</a:t>
             </a:fld>
             <a:endParaRPr lang="pt-BR"/>
           </a:p>
@@ -662,7 +662,7 @@
           <a:p>
             <a:fld id="{954BD786-5AF5-49DC-9045-FA446815DB20}" type="datetimeFigureOut">
               <a:rPr lang="pt-BR" smtClean="0"/>
-              <a:t>22/11/2022</a:t>
+              <a:t>09/12/2022</a:t>
             </a:fld>
             <a:endParaRPr lang="pt-BR"/>
           </a:p>
@@ -908,7 +908,7 @@
           <a:p>
             <a:fld id="{FB7BD717-C7D5-43BB-9F0C-DDEA8A279208}" type="datetimeFigureOut">
               <a:rPr lang="pt-BR" smtClean="0"/>
-              <a:t>22/11/2022</a:t>
+              <a:t>09/12/2022</a:t>
             </a:fld>
             <a:endParaRPr lang="pt-BR"/>
           </a:p>
@@ -1092,7 +1092,7 @@
           <a:p>
             <a:fld id="{FB7BD717-C7D5-43BB-9F0C-DDEA8A279208}" type="datetimeFigureOut">
               <a:rPr lang="pt-BR" smtClean="0"/>
-              <a:t>22/11/2022</a:t>
+              <a:t>09/12/2022</a:t>
             </a:fld>
             <a:endParaRPr lang="pt-BR"/>
           </a:p>
@@ -1343,7 +1343,7 @@
           <a:p>
             <a:fld id="{FB7BD717-C7D5-43BB-9F0C-DDEA8A279208}" type="datetimeFigureOut">
               <a:rPr lang="pt-BR" smtClean="0"/>
-              <a:t>22/11/2022</a:t>
+              <a:t>09/12/2022</a:t>
             </a:fld>
             <a:endParaRPr lang="pt-BR"/>
           </a:p>
@@ -1642,7 +1642,7 @@
           <a:p>
             <a:fld id="{FB7BD717-C7D5-43BB-9F0C-DDEA8A279208}" type="datetimeFigureOut">
               <a:rPr lang="pt-BR" smtClean="0"/>
-              <a:t>22/11/2022</a:t>
+              <a:t>09/12/2022</a:t>
             </a:fld>
             <a:endParaRPr lang="pt-BR"/>
           </a:p>
@@ -2081,7 +2081,7 @@
           <a:p>
             <a:fld id="{FB7BD717-C7D5-43BB-9F0C-DDEA8A279208}" type="datetimeFigureOut">
               <a:rPr lang="pt-BR" smtClean="0"/>
-              <a:t>22/11/2022</a:t>
+              <a:t>09/12/2022</a:t>
             </a:fld>
             <a:endParaRPr lang="pt-BR"/>
           </a:p>
@@ -2206,7 +2206,7 @@
           <a:p>
             <a:fld id="{FB7BD717-C7D5-43BB-9F0C-DDEA8A279208}" type="datetimeFigureOut">
               <a:rPr lang="pt-BR" smtClean="0"/>
-              <a:t>22/11/2022</a:t>
+              <a:t>09/12/2022</a:t>
             </a:fld>
             <a:endParaRPr lang="pt-BR"/>
           </a:p>
@@ -2301,7 +2301,7 @@
           <a:p>
             <a:fld id="{FB7BD717-C7D5-43BB-9F0C-DDEA8A279208}" type="datetimeFigureOut">
               <a:rPr lang="pt-BR" smtClean="0"/>
-              <a:t>22/11/2022</a:t>
+              <a:t>09/12/2022</a:t>
             </a:fld>
             <a:endParaRPr lang="pt-BR"/>
           </a:p>
@@ -2585,7 +2585,7 @@
           <a:p>
             <a:fld id="{FB7BD717-C7D5-43BB-9F0C-DDEA8A279208}" type="datetimeFigureOut">
               <a:rPr lang="pt-BR" smtClean="0"/>
-              <a:t>22/11/2022</a:t>
+              <a:t>09/12/2022</a:t>
             </a:fld>
             <a:endParaRPr lang="pt-BR"/>
           </a:p>
@@ -2753,7 +2753,7 @@
           <a:p>
             <a:fld id="{954BD786-5AF5-49DC-9045-FA446815DB20}" type="datetimeFigureOut">
               <a:rPr lang="pt-BR" smtClean="0"/>
-              <a:t>22/11/2022</a:t>
+              <a:t>09/12/2022</a:t>
             </a:fld>
             <a:endParaRPr lang="pt-BR"/>
           </a:p>
@@ -3014,7 +3014,7 @@
           <a:p>
             <a:fld id="{FB7BD717-C7D5-43BB-9F0C-DDEA8A279208}" type="datetimeFigureOut">
               <a:rPr lang="pt-BR" smtClean="0"/>
-              <a:t>22/11/2022</a:t>
+              <a:t>09/12/2022</a:t>
             </a:fld>
             <a:endParaRPr lang="pt-BR"/>
           </a:p>
@@ -3198,7 +3198,7 @@
           <a:p>
             <a:fld id="{FB7BD717-C7D5-43BB-9F0C-DDEA8A279208}" type="datetimeFigureOut">
               <a:rPr lang="pt-BR" smtClean="0"/>
-              <a:t>22/11/2022</a:t>
+              <a:t>09/12/2022</a:t>
             </a:fld>
             <a:endParaRPr lang="pt-BR"/>
           </a:p>
@@ -3382,7 +3382,7 @@
           <a:p>
             <a:fld id="{FB7BD717-C7D5-43BB-9F0C-DDEA8A279208}" type="datetimeFigureOut">
               <a:rPr lang="pt-BR" smtClean="0"/>
-              <a:t>22/11/2022</a:t>
+              <a:t>09/12/2022</a:t>
             </a:fld>
             <a:endParaRPr lang="pt-BR"/>
           </a:p>
@@ -3627,7 +3627,7 @@
           <a:p>
             <a:fld id="{954BD786-5AF5-49DC-9045-FA446815DB20}" type="datetimeFigureOut">
               <a:rPr lang="pt-BR" smtClean="0"/>
-              <a:t>22/11/2022</a:t>
+              <a:t>09/12/2022</a:t>
             </a:fld>
             <a:endParaRPr lang="pt-BR"/>
           </a:p>
@@ -3912,7 +3912,7 @@
           <a:p>
             <a:fld id="{954BD786-5AF5-49DC-9045-FA446815DB20}" type="datetimeFigureOut">
               <a:rPr lang="pt-BR" smtClean="0"/>
-              <a:t>22/11/2022</a:t>
+              <a:t>09/12/2022</a:t>
             </a:fld>
             <a:endParaRPr lang="pt-BR"/>
           </a:p>
@@ -4331,7 +4331,7 @@
           <a:p>
             <a:fld id="{954BD786-5AF5-49DC-9045-FA446815DB20}" type="datetimeFigureOut">
               <a:rPr lang="pt-BR" smtClean="0"/>
-              <a:t>22/11/2022</a:t>
+              <a:t>09/12/2022</a:t>
             </a:fld>
             <a:endParaRPr lang="pt-BR"/>
           </a:p>
@@ -4448,7 +4448,7 @@
           <a:p>
             <a:fld id="{954BD786-5AF5-49DC-9045-FA446815DB20}" type="datetimeFigureOut">
               <a:rPr lang="pt-BR" smtClean="0"/>
-              <a:t>22/11/2022</a:t>
+              <a:t>09/12/2022</a:t>
             </a:fld>
             <a:endParaRPr lang="pt-BR"/>
           </a:p>
@@ -4543,7 +4543,7 @@
           <a:p>
             <a:fld id="{954BD786-5AF5-49DC-9045-FA446815DB20}" type="datetimeFigureOut">
               <a:rPr lang="pt-BR" smtClean="0"/>
-              <a:t>22/11/2022</a:t>
+              <a:t>09/12/2022</a:t>
             </a:fld>
             <a:endParaRPr lang="pt-BR"/>
           </a:p>
@@ -4818,7 +4818,7 @@
           <a:p>
             <a:fld id="{954BD786-5AF5-49DC-9045-FA446815DB20}" type="datetimeFigureOut">
               <a:rPr lang="pt-BR" smtClean="0"/>
-              <a:t>22/11/2022</a:t>
+              <a:t>09/12/2022</a:t>
             </a:fld>
             <a:endParaRPr lang="pt-BR"/>
           </a:p>
@@ -5070,7 +5070,7 @@
           <a:p>
             <a:fld id="{954BD786-5AF5-49DC-9045-FA446815DB20}" type="datetimeFigureOut">
               <a:rPr lang="pt-BR" smtClean="0"/>
-              <a:t>22/11/2022</a:t>
+              <a:t>09/12/2022</a:t>
             </a:fld>
             <a:endParaRPr lang="pt-BR"/>
           </a:p>
@@ -5281,7 +5281,7 @@
           <a:p>
             <a:fld id="{954BD786-5AF5-49DC-9045-FA446815DB20}" type="datetimeFigureOut">
               <a:rPr lang="pt-BR" smtClean="0"/>
-              <a:t>22/11/2022</a:t>
+              <a:t>09/12/2022</a:t>
             </a:fld>
             <a:endParaRPr lang="pt-BR"/>
           </a:p>
@@ -5760,7 +5760,7 @@
           <a:p>
             <a:fld id="{FB7BD717-C7D5-43BB-9F0C-DDEA8A279208}" type="datetimeFigureOut">
               <a:rPr lang="pt-BR" smtClean="0"/>
-              <a:t>22/11/2022</a:t>
+              <a:t>09/12/2022</a:t>
             </a:fld>
             <a:endParaRPr lang="pt-BR"/>
           </a:p>
@@ -6788,15 +6788,7 @@
           <a:p>
             <a:r>
               <a:rPr lang="pt-BR" dirty="0"/>
-              <a:t>Ter maior domínio da linguagem </a:t>
-            </a:r>
-            <a:r>
-              <a:rPr lang="pt-BR" dirty="0" err="1"/>
-              <a:t>JavaScript</a:t>
-            </a:r>
-            <a:r>
-              <a:rPr lang="pt-BR" dirty="0"/>
-              <a:t>.</a:t>
+              <a:t>Ter maior domínio da linguagem JavaScript.</a:t>
             </a:r>
           </a:p>
           <a:p>
@@ -7098,6 +7090,57 @@
           <a:lstStyle/>
           <a:p>
             <a:endParaRPr lang="pt-BR" dirty="0"/>
+          </a:p>
+        </p:txBody>
+      </p:sp>
+      <p:sp>
+        <p:nvSpPr>
+          <p:cNvPr id="4" name="Retângulo 3">
+            <a:extLst>
+              <a:ext uri="{FF2B5EF4-FFF2-40B4-BE49-F238E27FC236}">
+                <a16:creationId xmlns:a16="http://schemas.microsoft.com/office/drawing/2014/main" id="{EF637330-23B7-4A55-A15F-E4F815DB615A}"/>
+              </a:ext>
+            </a:extLst>
+          </p:cNvPr>
+          <p:cNvSpPr/>
+          <p:nvPr/>
+        </p:nvSpPr>
+        <p:spPr>
+          <a:xfrm>
+            <a:off x="0" y="1574800"/>
+            <a:ext cx="9832528" cy="75754"/>
+          </a:xfrm>
+          <a:prstGeom prst="rect">
+            <a:avLst/>
+          </a:prstGeom>
+          <a:ln>
+            <a:solidFill>
+              <a:schemeClr val="accent1"/>
+            </a:solidFill>
+          </a:ln>
+        </p:spPr>
+        <p:style>
+          <a:lnRef idx="2">
+            <a:schemeClr val="accent1">
+              <a:shade val="50000"/>
+            </a:schemeClr>
+          </a:lnRef>
+          <a:fillRef idx="1">
+            <a:schemeClr val="accent1"/>
+          </a:fillRef>
+          <a:effectRef idx="0">
+            <a:schemeClr val="accent1"/>
+          </a:effectRef>
+          <a:fontRef idx="minor">
+            <a:schemeClr val="lt1"/>
+          </a:fontRef>
+        </p:style>
+        <p:txBody>
+          <a:bodyPr rtlCol="0" anchor="ctr"/>
+          <a:lstStyle/>
+          <a:p>
+            <a:pPr algn="ctr"/>
+            <a:endParaRPr lang="pt-BR"/>
           </a:p>
         </p:txBody>
       </p:sp>
@@ -7320,12 +7363,8 @@
               </a:lnSpc>
             </a:pPr>
             <a:r>
-              <a:rPr lang="pt-BR" sz="3600" dirty="0" err="1"/>
-              <a:t>Publico-Alvo</a:t>
-            </a:r>
-            <a:r>
               <a:rPr lang="pt-BR" sz="3600" dirty="0"/>
-              <a:t>: </a:t>
+              <a:t>Publico-Alvo: </a:t>
             </a:r>
           </a:p>
           <a:p>
@@ -7372,28 +7411,8 @@
               <a:buNone/>
             </a:pPr>
             <a:r>
-              <a:rPr lang="pt-BR" sz="1800" dirty="0" err="1"/>
-              <a:t>Ifood</a:t>
-            </a:r>
-            <a:r>
               <a:rPr lang="pt-BR" sz="1800" dirty="0"/>
-              <a:t>, </a:t>
-            </a:r>
-            <a:r>
-              <a:rPr lang="pt-BR" sz="1800" dirty="0" err="1"/>
-              <a:t>Rappi</a:t>
-            </a:r>
-            <a:r>
-              <a:rPr lang="pt-BR" sz="1800" dirty="0"/>
-              <a:t>, </a:t>
-            </a:r>
-            <a:r>
-              <a:rPr lang="pt-BR" sz="1800" dirty="0" err="1"/>
-              <a:t>UberEats</a:t>
-            </a:r>
-            <a:r>
-              <a:rPr lang="pt-BR" sz="1800" dirty="0"/>
-              <a:t> ...</a:t>
+              <a:t>Ifood, Rappi, UberEats ...</a:t>
             </a:r>
           </a:p>
         </p:txBody>
@@ -7600,7 +7619,7 @@
             </a:r>
             <a:r>
               <a:rPr lang="pt-BR" sz="2000" dirty="0"/>
-              <a:t>05/12/2022</a:t>
+              <a:t>12/12/2022</a:t>
             </a:r>
           </a:p>
           <a:p>
@@ -7793,20 +7812,8 @@
               <a:t> Fontes: </a:t>
             </a:r>
             <a:r>
-              <a:rPr lang="pt-BR" sz="2000" dirty="0" err="1"/>
-              <a:t>BadScript</a:t>
-            </a:r>
-            <a:r>
               <a:rPr lang="pt-BR" sz="2000" dirty="0"/>
-              <a:t>, </a:t>
-            </a:r>
-            <a:r>
-              <a:rPr lang="pt-BR" sz="2000" dirty="0" err="1"/>
-              <a:t>Nunito</a:t>
-            </a:r>
-            <a:r>
-              <a:rPr lang="pt-BR" sz="2000" dirty="0"/>
-              <a:t>.</a:t>
+              <a:t>BadScript, Nunito.</a:t>
             </a:r>
           </a:p>
           <a:p>
@@ -7828,7 +7835,7 @@
             </a:r>
             <a:r>
               <a:rPr lang="pt-BR" sz="2000" dirty="0"/>
-              <a:t>HTML/ CSS/ JAVASCRIPT/ NODE.JS/ SQL/ GIT/ GITHUB/</a:t>
+              <a:t>HTML/ CSS/ JAVASCRIPT/ SQL/ GIT/ GITHUB/C#</a:t>
             </a:r>
           </a:p>
         </p:txBody>
@@ -8064,48 +8071,16 @@
               <a:t> </a:t>
             </a:r>
             <a:r>
-              <a:rPr lang="pt-BR" sz="2000" dirty="0" err="1"/>
-              <a:t>splash</a:t>
-            </a:r>
-            <a:r>
               <a:rPr lang="pt-BR" sz="2000" dirty="0"/>
-              <a:t>/   </a:t>
-            </a:r>
-            <a:r>
-              <a:rPr lang="pt-BR" sz="2000" dirty="0" err="1"/>
-              <a:t>welcome</a:t>
-            </a:r>
-            <a:r>
-              <a:rPr lang="pt-BR" sz="2000" dirty="0"/>
-              <a:t>/</a:t>
+              <a:t>splash/   welcome/</a:t>
             </a:r>
             <a:r>
               <a:rPr lang="pt-BR" sz="3600" dirty="0"/>
               <a:t> </a:t>
             </a:r>
             <a:r>
-              <a:rPr lang="pt-BR" sz="2000" dirty="0" err="1"/>
-              <a:t>authentication</a:t>
-            </a:r>
-            <a:r>
               <a:rPr lang="pt-BR" sz="2000" dirty="0"/>
-              <a:t>/ cadastre-se/  home/  </a:t>
-            </a:r>
-            <a:r>
-              <a:rPr lang="pt-BR" sz="2000" dirty="0" err="1"/>
-              <a:t>list</a:t>
-            </a:r>
-            <a:r>
-              <a:rPr lang="pt-BR" sz="2000" dirty="0"/>
-              <a:t>/ complete/  card/                                </a:t>
-            </a:r>
-            <a:r>
-              <a:rPr lang="pt-BR" sz="2000" dirty="0" err="1"/>
-              <a:t>address</a:t>
-            </a:r>
-            <a:r>
-              <a:rPr lang="pt-BR" sz="2000" dirty="0"/>
-              <a:t>/  status/ perfil/</a:t>
+              <a:t>authentication/ cadastre-se/  home/  list/ complete/  card/                                address/  status/ perfil</a:t>
             </a:r>
           </a:p>
           <a:p>
@@ -8327,8 +8302,8 @@
         </p:nvSpPr>
         <p:spPr>
           <a:xfrm>
-            <a:off x="0" y="1578546"/>
-            <a:ext cx="9832528" cy="72008"/>
+            <a:off x="0" y="1574800"/>
+            <a:ext cx="9832528" cy="75754"/>
           </a:xfrm>
           <a:prstGeom prst="rect">
             <a:avLst/>

</xml_diff>

<commit_message>
conclusao do Powerpoint Projeto FINAL SENAI
</commit_message>
<xml_diff>
--- a/assets/documentacao_abnt/PowerPoint Projeto Final SENAI.pptx
+++ b/assets/documentacao_abnt/PowerPoint Projeto Final SENAI.pptx
@@ -316,7 +316,7 @@
           <a:p>
             <a:fld id="{954BD786-5AF5-49DC-9045-FA446815DB20}" type="datetimeFigureOut">
               <a:rPr lang="pt-BR" smtClean="0"/>
-              <a:t>09/12/2022</a:t>
+              <a:t>10/12/2022</a:t>
             </a:fld>
             <a:endParaRPr lang="pt-BR"/>
           </a:p>
@@ -484,7 +484,7 @@
           <a:p>
             <a:fld id="{954BD786-5AF5-49DC-9045-FA446815DB20}" type="datetimeFigureOut">
               <a:rPr lang="pt-BR" smtClean="0"/>
-              <a:t>09/12/2022</a:t>
+              <a:t>10/12/2022</a:t>
             </a:fld>
             <a:endParaRPr lang="pt-BR"/>
           </a:p>
@@ -662,7 +662,7 @@
           <a:p>
             <a:fld id="{954BD786-5AF5-49DC-9045-FA446815DB20}" type="datetimeFigureOut">
               <a:rPr lang="pt-BR" smtClean="0"/>
-              <a:t>09/12/2022</a:t>
+              <a:t>10/12/2022</a:t>
             </a:fld>
             <a:endParaRPr lang="pt-BR"/>
           </a:p>
@@ -908,7 +908,7 @@
           <a:p>
             <a:fld id="{FB7BD717-C7D5-43BB-9F0C-DDEA8A279208}" type="datetimeFigureOut">
               <a:rPr lang="pt-BR" smtClean="0"/>
-              <a:t>09/12/2022</a:t>
+              <a:t>10/12/2022</a:t>
             </a:fld>
             <a:endParaRPr lang="pt-BR"/>
           </a:p>
@@ -1092,7 +1092,7 @@
           <a:p>
             <a:fld id="{FB7BD717-C7D5-43BB-9F0C-DDEA8A279208}" type="datetimeFigureOut">
               <a:rPr lang="pt-BR" smtClean="0"/>
-              <a:t>09/12/2022</a:t>
+              <a:t>10/12/2022</a:t>
             </a:fld>
             <a:endParaRPr lang="pt-BR"/>
           </a:p>
@@ -1343,7 +1343,7 @@
           <a:p>
             <a:fld id="{FB7BD717-C7D5-43BB-9F0C-DDEA8A279208}" type="datetimeFigureOut">
               <a:rPr lang="pt-BR" smtClean="0"/>
-              <a:t>09/12/2022</a:t>
+              <a:t>10/12/2022</a:t>
             </a:fld>
             <a:endParaRPr lang="pt-BR"/>
           </a:p>
@@ -1642,7 +1642,7 @@
           <a:p>
             <a:fld id="{FB7BD717-C7D5-43BB-9F0C-DDEA8A279208}" type="datetimeFigureOut">
               <a:rPr lang="pt-BR" smtClean="0"/>
-              <a:t>09/12/2022</a:t>
+              <a:t>10/12/2022</a:t>
             </a:fld>
             <a:endParaRPr lang="pt-BR"/>
           </a:p>
@@ -2081,7 +2081,7 @@
           <a:p>
             <a:fld id="{FB7BD717-C7D5-43BB-9F0C-DDEA8A279208}" type="datetimeFigureOut">
               <a:rPr lang="pt-BR" smtClean="0"/>
-              <a:t>09/12/2022</a:t>
+              <a:t>10/12/2022</a:t>
             </a:fld>
             <a:endParaRPr lang="pt-BR"/>
           </a:p>
@@ -2206,7 +2206,7 @@
           <a:p>
             <a:fld id="{FB7BD717-C7D5-43BB-9F0C-DDEA8A279208}" type="datetimeFigureOut">
               <a:rPr lang="pt-BR" smtClean="0"/>
-              <a:t>09/12/2022</a:t>
+              <a:t>10/12/2022</a:t>
             </a:fld>
             <a:endParaRPr lang="pt-BR"/>
           </a:p>
@@ -2301,7 +2301,7 @@
           <a:p>
             <a:fld id="{FB7BD717-C7D5-43BB-9F0C-DDEA8A279208}" type="datetimeFigureOut">
               <a:rPr lang="pt-BR" smtClean="0"/>
-              <a:t>09/12/2022</a:t>
+              <a:t>10/12/2022</a:t>
             </a:fld>
             <a:endParaRPr lang="pt-BR"/>
           </a:p>
@@ -2585,7 +2585,7 @@
           <a:p>
             <a:fld id="{FB7BD717-C7D5-43BB-9F0C-DDEA8A279208}" type="datetimeFigureOut">
               <a:rPr lang="pt-BR" smtClean="0"/>
-              <a:t>09/12/2022</a:t>
+              <a:t>10/12/2022</a:t>
             </a:fld>
             <a:endParaRPr lang="pt-BR"/>
           </a:p>
@@ -2753,7 +2753,7 @@
           <a:p>
             <a:fld id="{954BD786-5AF5-49DC-9045-FA446815DB20}" type="datetimeFigureOut">
               <a:rPr lang="pt-BR" smtClean="0"/>
-              <a:t>09/12/2022</a:t>
+              <a:t>10/12/2022</a:t>
             </a:fld>
             <a:endParaRPr lang="pt-BR"/>
           </a:p>
@@ -3014,7 +3014,7 @@
           <a:p>
             <a:fld id="{FB7BD717-C7D5-43BB-9F0C-DDEA8A279208}" type="datetimeFigureOut">
               <a:rPr lang="pt-BR" smtClean="0"/>
-              <a:t>09/12/2022</a:t>
+              <a:t>10/12/2022</a:t>
             </a:fld>
             <a:endParaRPr lang="pt-BR"/>
           </a:p>
@@ -3198,7 +3198,7 @@
           <a:p>
             <a:fld id="{FB7BD717-C7D5-43BB-9F0C-DDEA8A279208}" type="datetimeFigureOut">
               <a:rPr lang="pt-BR" smtClean="0"/>
-              <a:t>09/12/2022</a:t>
+              <a:t>10/12/2022</a:t>
             </a:fld>
             <a:endParaRPr lang="pt-BR"/>
           </a:p>
@@ -3382,7 +3382,7 @@
           <a:p>
             <a:fld id="{FB7BD717-C7D5-43BB-9F0C-DDEA8A279208}" type="datetimeFigureOut">
               <a:rPr lang="pt-BR" smtClean="0"/>
-              <a:t>09/12/2022</a:t>
+              <a:t>10/12/2022</a:t>
             </a:fld>
             <a:endParaRPr lang="pt-BR"/>
           </a:p>
@@ -3627,7 +3627,7 @@
           <a:p>
             <a:fld id="{954BD786-5AF5-49DC-9045-FA446815DB20}" type="datetimeFigureOut">
               <a:rPr lang="pt-BR" smtClean="0"/>
-              <a:t>09/12/2022</a:t>
+              <a:t>10/12/2022</a:t>
             </a:fld>
             <a:endParaRPr lang="pt-BR"/>
           </a:p>
@@ -3912,7 +3912,7 @@
           <a:p>
             <a:fld id="{954BD786-5AF5-49DC-9045-FA446815DB20}" type="datetimeFigureOut">
               <a:rPr lang="pt-BR" smtClean="0"/>
-              <a:t>09/12/2022</a:t>
+              <a:t>10/12/2022</a:t>
             </a:fld>
             <a:endParaRPr lang="pt-BR"/>
           </a:p>
@@ -4331,7 +4331,7 @@
           <a:p>
             <a:fld id="{954BD786-5AF5-49DC-9045-FA446815DB20}" type="datetimeFigureOut">
               <a:rPr lang="pt-BR" smtClean="0"/>
-              <a:t>09/12/2022</a:t>
+              <a:t>10/12/2022</a:t>
             </a:fld>
             <a:endParaRPr lang="pt-BR"/>
           </a:p>
@@ -4448,7 +4448,7 @@
           <a:p>
             <a:fld id="{954BD786-5AF5-49DC-9045-FA446815DB20}" type="datetimeFigureOut">
               <a:rPr lang="pt-BR" smtClean="0"/>
-              <a:t>09/12/2022</a:t>
+              <a:t>10/12/2022</a:t>
             </a:fld>
             <a:endParaRPr lang="pt-BR"/>
           </a:p>
@@ -4543,7 +4543,7 @@
           <a:p>
             <a:fld id="{954BD786-5AF5-49DC-9045-FA446815DB20}" type="datetimeFigureOut">
               <a:rPr lang="pt-BR" smtClean="0"/>
-              <a:t>09/12/2022</a:t>
+              <a:t>10/12/2022</a:t>
             </a:fld>
             <a:endParaRPr lang="pt-BR"/>
           </a:p>
@@ -4818,7 +4818,7 @@
           <a:p>
             <a:fld id="{954BD786-5AF5-49DC-9045-FA446815DB20}" type="datetimeFigureOut">
               <a:rPr lang="pt-BR" smtClean="0"/>
-              <a:t>09/12/2022</a:t>
+              <a:t>10/12/2022</a:t>
             </a:fld>
             <a:endParaRPr lang="pt-BR"/>
           </a:p>
@@ -5070,7 +5070,7 @@
           <a:p>
             <a:fld id="{954BD786-5AF5-49DC-9045-FA446815DB20}" type="datetimeFigureOut">
               <a:rPr lang="pt-BR" smtClean="0"/>
-              <a:t>09/12/2022</a:t>
+              <a:t>10/12/2022</a:t>
             </a:fld>
             <a:endParaRPr lang="pt-BR"/>
           </a:p>
@@ -5281,7 +5281,7 @@
           <a:p>
             <a:fld id="{954BD786-5AF5-49DC-9045-FA446815DB20}" type="datetimeFigureOut">
               <a:rPr lang="pt-BR" smtClean="0"/>
-              <a:t>09/12/2022</a:t>
+              <a:t>10/12/2022</a:t>
             </a:fld>
             <a:endParaRPr lang="pt-BR"/>
           </a:p>
@@ -5760,7 +5760,7 @@
           <a:p>
             <a:fld id="{FB7BD717-C7D5-43BB-9F0C-DDEA8A279208}" type="datetimeFigureOut">
               <a:rPr lang="pt-BR" smtClean="0"/>
-              <a:t>09/12/2022</a:t>
+              <a:t>10/12/2022</a:t>
             </a:fld>
             <a:endParaRPr lang="pt-BR"/>
           </a:p>
@@ -6565,7 +6565,13 @@
           <a:bodyPr/>
           <a:lstStyle/>
           <a:p>
-            <a:endParaRPr lang="pt-BR" dirty="0"/>
+            <a:pPr marL="0" indent="0">
+              <a:buNone/>
+            </a:pPr>
+            <a:r>
+              <a:rPr lang="pt-BR" dirty="0"/>
+              <a:t> Criar um projeto real para desenvolver nossas habilidades no front-end e mostrar através desse projeto também o conhecimento absorvido no curso técnico de Desenvolvimento de Sistemas.</a:t>
+            </a:r>
           </a:p>
         </p:txBody>
       </p:sp>
@@ -7003,7 +7009,13 @@
           <a:bodyPr/>
           <a:lstStyle/>
           <a:p>
-            <a:endParaRPr lang="pt-BR"/>
+            <a:pPr marL="0" indent="0">
+              <a:buNone/>
+            </a:pPr>
+            <a:r>
+              <a:rPr lang="pt-BR" dirty="0"/>
+              <a:t>   Projeto concluído com sucesso.</a:t>
+            </a:r>
           </a:p>
         </p:txBody>
       </p:sp>
@@ -7084,63 +7096,25 @@
             <p:ph idx="1"/>
           </p:nvPr>
         </p:nvSpPr>
-        <p:spPr/>
-        <p:txBody>
-          <a:bodyPr/>
-          <a:lstStyle/>
-          <a:p>
-            <a:endParaRPr lang="pt-BR" dirty="0"/>
-          </a:p>
-        </p:txBody>
-      </p:sp>
-      <p:sp>
-        <p:nvSpPr>
-          <p:cNvPr id="4" name="Retângulo 3">
-            <a:extLst>
-              <a:ext uri="{FF2B5EF4-FFF2-40B4-BE49-F238E27FC236}">
-                <a16:creationId xmlns:a16="http://schemas.microsoft.com/office/drawing/2014/main" id="{EF637330-23B7-4A55-A15F-E4F815DB615A}"/>
-              </a:ext>
-            </a:extLst>
-          </p:cNvPr>
-          <p:cNvSpPr/>
-          <p:nvPr/>
-        </p:nvSpPr>
         <p:spPr>
           <a:xfrm>
-            <a:off x="0" y="1574800"/>
-            <a:ext cx="9832528" cy="75754"/>
+            <a:off x="508000" y="1778000"/>
+            <a:ext cx="9144000" cy="2032794"/>
           </a:xfrm>
-          <a:prstGeom prst="rect">
-            <a:avLst/>
-          </a:prstGeom>
-          <a:ln>
-            <a:solidFill>
-              <a:schemeClr val="accent1"/>
-            </a:solidFill>
-          </a:ln>
         </p:spPr>
-        <p:style>
-          <a:lnRef idx="2">
-            <a:schemeClr val="accent1">
-              <a:shade val="50000"/>
-            </a:schemeClr>
-          </a:lnRef>
-          <a:fillRef idx="1">
-            <a:schemeClr val="accent1"/>
-          </a:fillRef>
-          <a:effectRef idx="0">
-            <a:schemeClr val="accent1"/>
-          </a:effectRef>
-          <a:fontRef idx="minor">
-            <a:schemeClr val="lt1"/>
-          </a:fontRef>
-        </p:style>
-        <p:txBody>
-          <a:bodyPr rtlCol="0" anchor="ctr"/>
-          <a:lstStyle/>
-          <a:p>
-            <a:pPr algn="ctr"/>
-            <a:endParaRPr lang="pt-BR"/>
+        <p:txBody>
+          <a:bodyPr/>
+          <a:lstStyle/>
+          <a:p>
+            <a:pPr marL="0" indent="0">
+              <a:buNone/>
+            </a:pPr>
+            <a:r>
+              <a:rPr lang="pt-BR" dirty="0">
+                <a:cs typeface="Arial" panose="020B0604020202020204" pitchFamily="34" charset="0"/>
+              </a:rPr>
+              <a:t>Um site de delivery que permite o usuário realizar ciclos de compra através de um dispositivo mobile ou desktop.</a:t>
+            </a:r>
           </a:p>
         </p:txBody>
       </p:sp>
@@ -8426,7 +8400,13 @@
           <a:bodyPr/>
           <a:lstStyle/>
           <a:p>
-            <a:endParaRPr lang="pt-BR" dirty="0"/>
+            <a:pPr marL="0" indent="0">
+              <a:buNone/>
+            </a:pPr>
+            <a:r>
+              <a:rPr lang="pt-BR" dirty="0"/>
+              <a:t> Desenvolver um site de delivery com as principais funcionalidades e etapas de compra inspirado em grandes empresas de fast food como: Ifood, Rappi, UberEats .</a:t>
+            </a:r>
           </a:p>
         </p:txBody>
       </p:sp>

</xml_diff>